<commit_message>
FINAL PLOTS DONE DONE + Wrote all result figure texts
Tomorrow I absolutely will write ALL missing results text
</commit_message>
<xml_diff>
--- a/Writing/Thesis_Figures/Select_SS_compositions.pptx
+++ b/Writing/Thesis_Figures/Select_SS_compositions.pptx
@@ -104,6 +104,11 @@
       </a:defRPr>
     </a:lvl9pPr>
   </p:defaultTextStyle>
+  <p:extLst>
+    <p:ext uri="{EFAFB233-063F-42B5-8137-9DF3F51BA10A}">
+      <p15:sldGuideLst xmlns:p15="http://schemas.microsoft.com/office/powerpoint/2012/main"/>
+    </p:ext>
+  </p:extLst>
 </p:presentation>
 </file>
 
@@ -238,7 +243,7 @@
           <a:p>
             <a:fld id="{CC055918-652B-574A-8F65-A77BE4C837AD}" type="datetimeFigureOut">
               <a:rPr lang="da-DK" smtClean="0"/>
-              <a:t>26.10.2023</a:t>
+              <a:t>27.10.2023</a:t>
             </a:fld>
             <a:endParaRPr lang="da-DK"/>
           </a:p>
@@ -408,7 +413,7 @@
           <a:p>
             <a:fld id="{CC055918-652B-574A-8F65-A77BE4C837AD}" type="datetimeFigureOut">
               <a:rPr lang="da-DK" smtClean="0"/>
-              <a:t>26.10.2023</a:t>
+              <a:t>27.10.2023</a:t>
             </a:fld>
             <a:endParaRPr lang="da-DK"/>
           </a:p>
@@ -588,7 +593,7 @@
           <a:p>
             <a:fld id="{CC055918-652B-574A-8F65-A77BE4C837AD}" type="datetimeFigureOut">
               <a:rPr lang="da-DK" smtClean="0"/>
-              <a:t>26.10.2023</a:t>
+              <a:t>27.10.2023</a:t>
             </a:fld>
             <a:endParaRPr lang="da-DK"/>
           </a:p>
@@ -758,7 +763,7 @@
           <a:p>
             <a:fld id="{CC055918-652B-574A-8F65-A77BE4C837AD}" type="datetimeFigureOut">
               <a:rPr lang="da-DK" smtClean="0"/>
-              <a:t>26.10.2023</a:t>
+              <a:t>27.10.2023</a:t>
             </a:fld>
             <a:endParaRPr lang="da-DK"/>
           </a:p>
@@ -1002,7 +1007,7 @@
           <a:p>
             <a:fld id="{CC055918-652B-574A-8F65-A77BE4C837AD}" type="datetimeFigureOut">
               <a:rPr lang="da-DK" smtClean="0"/>
-              <a:t>26.10.2023</a:t>
+              <a:t>27.10.2023</a:t>
             </a:fld>
             <a:endParaRPr lang="da-DK"/>
           </a:p>
@@ -1234,7 +1239,7 @@
           <a:p>
             <a:fld id="{CC055918-652B-574A-8F65-A77BE4C837AD}" type="datetimeFigureOut">
               <a:rPr lang="da-DK" smtClean="0"/>
-              <a:t>26.10.2023</a:t>
+              <a:t>27.10.2023</a:t>
             </a:fld>
             <a:endParaRPr lang="da-DK"/>
           </a:p>
@@ -1601,7 +1606,7 @@
           <a:p>
             <a:fld id="{CC055918-652B-574A-8F65-A77BE4C837AD}" type="datetimeFigureOut">
               <a:rPr lang="da-DK" smtClean="0"/>
-              <a:t>26.10.2023</a:t>
+              <a:t>27.10.2023</a:t>
             </a:fld>
             <a:endParaRPr lang="da-DK"/>
           </a:p>
@@ -1719,7 +1724,7 @@
           <a:p>
             <a:fld id="{CC055918-652B-574A-8F65-A77BE4C837AD}" type="datetimeFigureOut">
               <a:rPr lang="da-DK" smtClean="0"/>
-              <a:t>26.10.2023</a:t>
+              <a:t>27.10.2023</a:t>
             </a:fld>
             <a:endParaRPr lang="da-DK"/>
           </a:p>
@@ -1814,7 +1819,7 @@
           <a:p>
             <a:fld id="{CC055918-652B-574A-8F65-A77BE4C837AD}" type="datetimeFigureOut">
               <a:rPr lang="da-DK" smtClean="0"/>
-              <a:t>26.10.2023</a:t>
+              <a:t>27.10.2023</a:t>
             </a:fld>
             <a:endParaRPr lang="da-DK"/>
           </a:p>
@@ -2091,7 +2096,7 @@
           <a:p>
             <a:fld id="{CC055918-652B-574A-8F65-A77BE4C837AD}" type="datetimeFigureOut">
               <a:rPr lang="da-DK" smtClean="0"/>
-              <a:t>26.10.2023</a:t>
+              <a:t>27.10.2023</a:t>
             </a:fld>
             <a:endParaRPr lang="da-DK"/>
           </a:p>
@@ -2348,7 +2353,7 @@
           <a:p>
             <a:fld id="{CC055918-652B-574A-8F65-A77BE4C837AD}" type="datetimeFigureOut">
               <a:rPr lang="da-DK" smtClean="0"/>
-              <a:t>26.10.2023</a:t>
+              <a:t>27.10.2023</a:t>
             </a:fld>
             <a:endParaRPr lang="da-DK"/>
           </a:p>
@@ -2561,7 +2566,7 @@
           <a:p>
             <a:fld id="{CC055918-652B-574A-8F65-A77BE4C837AD}" type="datetimeFigureOut">
               <a:rPr lang="da-DK" smtClean="0"/>
-              <a:t>26.10.2023</a:t>
+              <a:t>27.10.2023</a:t>
             </a:fld>
             <a:endParaRPr lang="da-DK"/>
           </a:p>
@@ -3411,7 +3416,7 @@
         <p:spPr>
           <a:xfrm>
             <a:off x="4978401" y="9617075"/>
-            <a:ext cx="543739" cy="523220"/>
+            <a:ext cx="564578" cy="523220"/>
           </a:xfrm>
           <a:prstGeom prst="rect">
             <a:avLst/>
@@ -3429,7 +3434,7 @@
                 <a:latin typeface="Times New Roman" panose="02020603050405020304" pitchFamily="18" charset="0"/>
                 <a:cs typeface="Times New Roman" panose="02020603050405020304" pitchFamily="18" charset="0"/>
               </a:rPr>
-              <a:t>3a</a:t>
+              <a:t>3b</a:t>
             </a:r>
           </a:p>
         </p:txBody>

</xml_diff>